<commit_message>
Update 3900 Presentation Group 9.pptx
</commit_message>
<xml_diff>
--- a/Documentation/3900 Presentation Group 9.pptx
+++ b/Documentation/3900 Presentation Group 9.pptx
@@ -6,6 +6,7 @@
   </p:sldMasterIdLst>
   <p:sldIdLst>
     <p:sldId id="256" r:id="rId2"/>
+    <p:sldId id="257" r:id="rId3"/>
   </p:sldIdLst>
   <p:sldSz cx="12192000" cy="6858000"/>
   <p:notesSz cx="6858000" cy="9144000"/>
@@ -3443,6 +3444,13 @@
             <a:avLst/>
           </a:prstGeom>
           <a:noFill/>
+          <a:effectLst>
+            <a:outerShdw blurRad="50800" dist="38100" dir="2700000" algn="tl" rotWithShape="0">
+              <a:prstClr val="black">
+                <a:alpha val="40000"/>
+              </a:prstClr>
+            </a:outerShdw>
+          </a:effectLst>
         </p:spPr>
         <p:txBody>
           <a:bodyPr wrap="square" rtlCol="0">
@@ -3561,6 +3569,327 @@
     <p:extLst>
       <p:ext uri="{BB962C8B-B14F-4D97-AF65-F5344CB8AC3E}">
         <p14:creationId xmlns:p14="http://schemas.microsoft.com/office/powerpoint/2010/main" val="3053488728"/>
+      </p:ext>
+    </p:extLst>
+  </p:cSld>
+  <p:clrMapOvr>
+    <a:masterClrMapping/>
+  </p:clrMapOvr>
+</p:sld>
+</file>
+
+<file path=ppt/slides/slide2.xml><?xml version="1.0" encoding="utf-8"?>
+<p:sld xmlns:a="http://schemas.openxmlformats.org/drawingml/2006/main" xmlns:r="http://schemas.openxmlformats.org/officeDocument/2006/relationships" xmlns:p="http://schemas.openxmlformats.org/presentationml/2006/main">
+  <p:cSld>
+    <p:spTree>
+      <p:nvGrpSpPr>
+        <p:cNvPr id="1" name=""/>
+        <p:cNvGrpSpPr/>
+        <p:nvPr/>
+      </p:nvGrpSpPr>
+      <p:grpSpPr>
+        <a:xfrm>
+          <a:off x="0" y="0"/>
+          <a:ext cx="0" cy="0"/>
+          <a:chOff x="0" y="0"/>
+          <a:chExt cx="0" cy="0"/>
+        </a:xfrm>
+      </p:grpSpPr>
+      <p:sp>
+        <p:nvSpPr>
+          <p:cNvPr id="5" name="Rectangle 4">
+            <a:extLst>
+              <a:ext uri="{FF2B5EF4-FFF2-40B4-BE49-F238E27FC236}">
+                <a16:creationId xmlns:a16="http://schemas.microsoft.com/office/drawing/2014/main" id="{7DE55365-B231-436C-B90D-2B732A332B3B}"/>
+              </a:ext>
+            </a:extLst>
+          </p:cNvPr>
+          <p:cNvSpPr/>
+          <p:nvPr/>
+        </p:nvSpPr>
+        <p:spPr>
+          <a:xfrm>
+            <a:off x="0" y="0"/>
+            <a:ext cx="5770485" cy="6858000"/>
+          </a:xfrm>
+          <a:prstGeom prst="rect">
+            <a:avLst/>
+          </a:prstGeom>
+          <a:ln>
+            <a:noFill/>
+          </a:ln>
+        </p:spPr>
+        <p:style>
+          <a:lnRef idx="2">
+            <a:schemeClr val="accent1">
+              <a:shade val="50000"/>
+            </a:schemeClr>
+          </a:lnRef>
+          <a:fillRef idx="1">
+            <a:schemeClr val="accent1"/>
+          </a:fillRef>
+          <a:effectRef idx="0">
+            <a:schemeClr val="accent1"/>
+          </a:effectRef>
+          <a:fontRef idx="minor">
+            <a:schemeClr val="lt1"/>
+          </a:fontRef>
+        </p:style>
+        <p:txBody>
+          <a:bodyPr rtlCol="0" anchor="ctr"/>
+          <a:lstStyle/>
+          <a:p>
+            <a:pPr algn="ctr"/>
+            <a:endParaRPr lang="en-US" dirty="0"/>
+          </a:p>
+        </p:txBody>
+      </p:sp>
+      <p:sp>
+        <p:nvSpPr>
+          <p:cNvPr id="4" name="TextBox 3">
+            <a:extLst>
+              <a:ext uri="{FF2B5EF4-FFF2-40B4-BE49-F238E27FC236}">
+                <a16:creationId xmlns:a16="http://schemas.microsoft.com/office/drawing/2014/main" id="{D915522F-9914-4739-9902-75CBFFE6C6E3}"/>
+              </a:ext>
+            </a:extLst>
+          </p:cNvPr>
+          <p:cNvSpPr txBox="1"/>
+          <p:nvPr/>
+        </p:nvSpPr>
+        <p:spPr>
+          <a:xfrm>
+            <a:off x="443883" y="272577"/>
+            <a:ext cx="6072327" cy="4093428"/>
+          </a:xfrm>
+          <a:prstGeom prst="rect">
+            <a:avLst/>
+          </a:prstGeom>
+          <a:noFill/>
+          <a:effectLst>
+            <a:outerShdw blurRad="50800" dist="38100" algn="l" rotWithShape="0">
+              <a:prstClr val="black">
+                <a:alpha val="40000"/>
+              </a:prstClr>
+            </a:outerShdw>
+          </a:effectLst>
+        </p:spPr>
+        <p:txBody>
+          <a:bodyPr wrap="square" rtlCol="0">
+            <a:spAutoFit/>
+          </a:bodyPr>
+          <a:lstStyle/>
+          <a:p>
+            <a:r>
+              <a:rPr lang="en-US" sz="13000" dirty="0">
+                <a:solidFill>
+                  <a:schemeClr val="bg1"/>
+                </a:solidFill>
+                <a:latin typeface="Harlow Solid Italic" panose="04030604020F02020D02" pitchFamily="82" charset="0"/>
+              </a:rPr>
+              <a:t>The Idea</a:t>
+            </a:r>
+          </a:p>
+        </p:txBody>
+      </p:sp>
+      <p:pic>
+        <p:nvPicPr>
+          <p:cNvPr id="2052" name="Picture 4" descr="Image result for google maps">
+            <a:extLst>
+              <a:ext uri="{FF2B5EF4-FFF2-40B4-BE49-F238E27FC236}">
+                <a16:creationId xmlns:a16="http://schemas.microsoft.com/office/drawing/2014/main" id="{196729F6-9575-46E3-9A0E-436C990F7E2F}"/>
+              </a:ext>
+            </a:extLst>
+          </p:cNvPr>
+          <p:cNvPicPr>
+            <a:picLocks noChangeAspect="1" noChangeArrowheads="1"/>
+          </p:cNvPicPr>
+          <p:nvPr/>
+        </p:nvPicPr>
+        <p:blipFill>
+          <a:blip r:embed="rId2">
+            <a:extLst>
+              <a:ext uri="{28A0092B-C50C-407E-A947-70E740481C1C}">
+                <a14:useLocalDpi xmlns:a14="http://schemas.microsoft.com/office/drawing/2010/main" val="0"/>
+              </a:ext>
+            </a:extLst>
+          </a:blip>
+          <a:srcRect/>
+          <a:stretch>
+            <a:fillRect/>
+          </a:stretch>
+        </p:blipFill>
+        <p:spPr bwMode="auto">
+          <a:xfrm>
+            <a:off x="5334000" y="0"/>
+            <a:ext cx="6858000" cy="6858000"/>
+          </a:xfrm>
+          <a:prstGeom prst="rect">
+            <a:avLst/>
+          </a:prstGeom>
+          <a:noFill/>
+          <a:extLst>
+            <a:ext uri="{909E8E84-426E-40DD-AFC4-6F175D3DCCD1}">
+              <a14:hiddenFill xmlns:a14="http://schemas.microsoft.com/office/drawing/2010/main">
+                <a:solidFill>
+                  <a:srgbClr val="FFFFFF"/>
+                </a:solidFill>
+              </a14:hiddenFill>
+            </a:ext>
+          </a:extLst>
+        </p:spPr>
+      </p:pic>
+      <p:sp>
+        <p:nvSpPr>
+          <p:cNvPr id="6" name="Oval 5">
+            <a:extLst>
+              <a:ext uri="{FF2B5EF4-FFF2-40B4-BE49-F238E27FC236}">
+                <a16:creationId xmlns:a16="http://schemas.microsoft.com/office/drawing/2014/main" id="{85F09677-5187-4CD7-82DC-A22034E2F9B9}"/>
+              </a:ext>
+            </a:extLst>
+          </p:cNvPr>
+          <p:cNvSpPr/>
+          <p:nvPr/>
+        </p:nvSpPr>
+        <p:spPr>
+          <a:xfrm>
+            <a:off x="7767961" y="2370339"/>
+            <a:ext cx="1878321" cy="1858022"/>
+          </a:xfrm>
+          <a:prstGeom prst="ellipse">
+            <a:avLst/>
+          </a:prstGeom>
+          <a:solidFill>
+            <a:srgbClr val="F41414">
+              <a:alpha val="20000"/>
+            </a:srgbClr>
+          </a:solidFill>
+          <a:ln>
+            <a:noFill/>
+          </a:ln>
+        </p:spPr>
+        <p:style>
+          <a:lnRef idx="2">
+            <a:schemeClr val="accent1">
+              <a:shade val="50000"/>
+            </a:schemeClr>
+          </a:lnRef>
+          <a:fillRef idx="1">
+            <a:schemeClr val="accent1"/>
+          </a:fillRef>
+          <a:effectRef idx="0">
+            <a:schemeClr val="accent1"/>
+          </a:effectRef>
+          <a:fontRef idx="minor">
+            <a:schemeClr val="lt1"/>
+          </a:fontRef>
+        </p:style>
+        <p:txBody>
+          <a:bodyPr rtlCol="0" anchor="ctr"/>
+          <a:lstStyle/>
+          <a:p>
+            <a:pPr algn="ctr"/>
+            <a:endParaRPr lang="en-US" dirty="0"/>
+          </a:p>
+        </p:txBody>
+      </p:sp>
+      <p:pic>
+        <p:nvPicPr>
+          <p:cNvPr id="2064" name="Picture 16" descr="Image result for google maps icon png">
+            <a:extLst>
+              <a:ext uri="{FF2B5EF4-FFF2-40B4-BE49-F238E27FC236}">
+                <a16:creationId xmlns:a16="http://schemas.microsoft.com/office/drawing/2014/main" id="{B67F98C2-9730-4587-B968-9A992B013E91}"/>
+              </a:ext>
+            </a:extLst>
+          </p:cNvPr>
+          <p:cNvPicPr>
+            <a:picLocks noChangeAspect="1" noChangeArrowheads="1"/>
+          </p:cNvPicPr>
+          <p:nvPr/>
+        </p:nvPicPr>
+        <p:blipFill>
+          <a:blip r:embed="rId3">
+            <a:extLst>
+              <a:ext uri="{28A0092B-C50C-407E-A947-70E740481C1C}">
+                <a14:useLocalDpi xmlns:a14="http://schemas.microsoft.com/office/drawing/2010/main" val="0"/>
+              </a:ext>
+            </a:extLst>
+          </a:blip>
+          <a:srcRect/>
+          <a:stretch>
+            <a:fillRect/>
+          </a:stretch>
+        </p:blipFill>
+        <p:spPr bwMode="auto">
+          <a:xfrm>
+            <a:off x="368423" y="5486400"/>
+            <a:ext cx="1282824" cy="1282824"/>
+          </a:xfrm>
+          <a:prstGeom prst="rect">
+            <a:avLst/>
+          </a:prstGeom>
+          <a:noFill/>
+          <a:extLst>
+            <a:ext uri="{909E8E84-426E-40DD-AFC4-6F175D3DCCD1}">
+              <a14:hiddenFill xmlns:a14="http://schemas.microsoft.com/office/drawing/2010/main">
+                <a:solidFill>
+                  <a:srgbClr val="FFFFFF"/>
+                </a:solidFill>
+              </a14:hiddenFill>
+            </a:ext>
+          </a:extLst>
+        </p:spPr>
+      </p:pic>
+      <p:pic>
+        <p:nvPicPr>
+          <p:cNvPr id="2068" name="Picture 20" descr="Image result for bluetooth icon png">
+            <a:extLst>
+              <a:ext uri="{FF2B5EF4-FFF2-40B4-BE49-F238E27FC236}">
+                <a16:creationId xmlns:a16="http://schemas.microsoft.com/office/drawing/2014/main" id="{5DD28775-4B8D-4050-9E46-046226047263}"/>
+              </a:ext>
+            </a:extLst>
+          </p:cNvPr>
+          <p:cNvPicPr>
+            <a:picLocks noChangeAspect="1" noChangeArrowheads="1"/>
+          </p:cNvPicPr>
+          <p:nvPr/>
+        </p:nvPicPr>
+        <p:blipFill>
+          <a:blip r:embed="rId4">
+            <a:extLst>
+              <a:ext uri="{28A0092B-C50C-407E-A947-70E740481C1C}">
+                <a14:useLocalDpi xmlns:a14="http://schemas.microsoft.com/office/drawing/2010/main" val="0"/>
+              </a:ext>
+            </a:extLst>
+          </a:blip>
+          <a:srcRect/>
+          <a:stretch>
+            <a:fillRect/>
+          </a:stretch>
+        </p:blipFill>
+        <p:spPr bwMode="auto">
+          <a:xfrm>
+            <a:off x="3980527" y="5424256"/>
+            <a:ext cx="1282824" cy="1282824"/>
+          </a:xfrm>
+          <a:prstGeom prst="rect">
+            <a:avLst/>
+          </a:prstGeom>
+          <a:noFill/>
+          <a:extLst>
+            <a:ext uri="{909E8E84-426E-40DD-AFC4-6F175D3DCCD1}">
+              <a14:hiddenFill xmlns:a14="http://schemas.microsoft.com/office/drawing/2010/main">
+                <a:solidFill>
+                  <a:srgbClr val="FFFFFF"/>
+                </a:solidFill>
+              </a14:hiddenFill>
+            </a:ext>
+          </a:extLst>
+        </p:spPr>
+      </p:pic>
+    </p:spTree>
+    <p:extLst>
+      <p:ext uri="{BB962C8B-B14F-4D97-AF65-F5344CB8AC3E}">
+        <p14:creationId xmlns:p14="http://schemas.microsoft.com/office/powerpoint/2010/main" val="3423634141"/>
       </p:ext>
     </p:extLst>
   </p:cSld>

</xml_diff>